<commit_message>
STuff and things FINAL
</commit_message>
<xml_diff>
--- a/Learn 2 Math Phase 4/Learn 2 Math final.pptx
+++ b/Learn 2 Math Phase 4/Learn 2 Math final.pptx
@@ -561,6 +561,9 @@
   <p:clrMapOvr>
     <a:overrideClrMapping bg1="dk1" tx1="lt1" bg2="dk2" tx2="lt2" accent1="accent1" accent2="accent2" accent3="accent3" accent4="accent4" accent5="accent5" accent6="accent6" hlink="hlink" folHlink="folHlink"/>
   </p:clrMapOvr>
+  <p:transition>
+    <p:pull dir="lu"/>
+  </p:transition>
 </p:sldLayout>
 </file>
 
@@ -728,6 +731,9 @@
   <p:clrMapOvr>
     <a:masterClrMapping/>
   </p:clrMapOvr>
+  <p:transition>
+    <p:pull dir="lu"/>
+  </p:transition>
 </p:sldLayout>
 </file>
 
@@ -905,6 +911,9 @@
   <p:clrMapOvr>
     <a:masterClrMapping/>
   </p:clrMapOvr>
+  <p:transition>
+    <p:pull dir="lu"/>
+  </p:transition>
 </p:sldLayout>
 </file>
 
@@ -1076,6 +1085,9 @@
   <p:clrMapOvr>
     <a:masterClrMapping/>
   </p:clrMapOvr>
+  <p:transition>
+    <p:pull dir="lu"/>
+  </p:transition>
 </p:sldLayout>
 </file>
 
@@ -1533,6 +1545,9 @@
   <p:clrMapOvr>
     <a:overrideClrMapping bg1="dk1" tx1="lt1" bg2="dk2" tx2="lt2" accent1="accent1" accent2="accent2" accent3="accent3" accent4="accent4" accent5="accent5" accent6="accent6" hlink="hlink" folHlink="folHlink"/>
   </p:clrMapOvr>
+  <p:transition>
+    <p:pull dir="lu"/>
+  </p:transition>
 </p:sldLayout>
 </file>
 
@@ -1799,6 +1814,9 @@
   <p:clrMapOvr>
     <a:masterClrMapping/>
   </p:clrMapOvr>
+  <p:transition>
+    <p:pull dir="lu"/>
+  </p:transition>
 </p:sldLayout>
 </file>
 
@@ -2175,6 +2193,9 @@
   <p:clrMapOvr>
     <a:masterClrMapping/>
   </p:clrMapOvr>
+  <p:transition>
+    <p:pull dir="lu"/>
+  </p:transition>
 </p:sldLayout>
 </file>
 
@@ -2299,6 +2320,9 @@
   <p:clrMapOvr>
     <a:masterClrMapping/>
   </p:clrMapOvr>
+  <p:transition>
+    <p:pull dir="lu"/>
+  </p:transition>
 </p:sldLayout>
 </file>
 
@@ -2391,6 +2415,9 @@
   <p:clrMapOvr>
     <a:masterClrMapping/>
   </p:clrMapOvr>
+  <p:transition>
+    <p:pull dir="lu"/>
+  </p:transition>
 </p:sldLayout>
 </file>
 
@@ -2647,6 +2674,9 @@
   <p:clrMapOvr>
     <a:masterClrMapping/>
   </p:clrMapOvr>
+  <p:transition>
+    <p:pull dir="lu"/>
+  </p:transition>
 </p:sldLayout>
 </file>
 
@@ -2903,6 +2933,9 @@
   <p:clrMapOvr>
     <a:masterClrMapping/>
   </p:clrMapOvr>
+  <p:transition>
+    <p:pull dir="lu"/>
+  </p:transition>
 </p:sldLayout>
 </file>
 
@@ -3356,6 +3389,9 @@
     <p:sldLayoutId id="2147483934" r:id="rId10"/>
     <p:sldLayoutId id="2147483935" r:id="rId11"/>
   </p:sldLayoutIdLst>
+  <p:transition>
+    <p:pull dir="lu"/>
+  </p:transition>
   <p:txStyles>
     <p:titleStyle>
       <a:lvl1pPr algn="l" rtl="0" eaLnBrk="1" latinLnBrk="0" hangingPunct="1">
@@ -4088,6 +4124,9 @@
   <p:clrMapOvr>
     <a:masterClrMapping/>
   </p:clrMapOvr>
+  <p:transition>
+    <p:pull dir="lu"/>
+  </p:transition>
   <p:timing>
     <p:tnLst>
       <p:par>
@@ -4169,15 +4208,7 @@
           <a:p>
             <a:r>
               <a:rPr lang="en-US" dirty="0" smtClean="0"/>
-              <a:t>3.2.2 </a:t>
-            </a:r>
-            <a:r>
-              <a:rPr lang="en-US" dirty="0" smtClean="0"/>
-              <a:t>Tutorials shall use pictures to teach users</a:t>
-            </a:r>
-            <a:r>
-              <a:rPr lang="en-US" dirty="0" smtClean="0"/>
-              <a:t>.</a:t>
+              <a:t>3.2.2 Tutorials shall use pictures to teach users.</a:t>
             </a:r>
           </a:p>
           <a:p>
@@ -4189,15 +4220,7 @@
           <a:p>
             <a:r>
               <a:rPr lang="en-US" dirty="0" smtClean="0"/>
-              <a:t>3.2.3 </a:t>
-            </a:r>
-            <a:r>
-              <a:rPr lang="en-US" dirty="0" smtClean="0"/>
-              <a:t>Tutorials shall use words to teach users</a:t>
-            </a:r>
-            <a:r>
-              <a:rPr lang="en-US" dirty="0" smtClean="0"/>
-              <a:t>.</a:t>
+              <a:t>3.2.3 Tutorials shall use words to teach users.</a:t>
             </a:r>
           </a:p>
           <a:p>
@@ -4209,15 +4232,7 @@
           <a:p>
             <a:r>
               <a:rPr lang="en-US" dirty="0" smtClean="0"/>
-              <a:t>3.2.4 </a:t>
-            </a:r>
-            <a:r>
-              <a:rPr lang="en-US" dirty="0" smtClean="0"/>
-              <a:t>The tutorial shall teach Number sense and operation skills</a:t>
-            </a:r>
-            <a:r>
-              <a:rPr lang="en-US" dirty="0" smtClean="0"/>
-              <a:t>.</a:t>
+              <a:t>3.2.4 The tutorial shall teach Number sense and operation skills.</a:t>
             </a:r>
             <a:endParaRPr lang="en-AU" dirty="0" smtClean="0"/>
           </a:p>
@@ -4227,11 +4242,7 @@
           <a:p>
             <a:r>
               <a:rPr lang="en-US" dirty="0" smtClean="0"/>
-              <a:t>3.2.5 The Tutorials will be load the images and text file from a folder</a:t>
-            </a:r>
-            <a:r>
-              <a:rPr lang="en-US" dirty="0" smtClean="0"/>
-              <a:t>.</a:t>
+              <a:t>3.2.5 The Tutorials will be load the images and text file from a folder.</a:t>
             </a:r>
           </a:p>
           <a:p>
@@ -4240,11 +4251,7 @@
           <a:p>
             <a:r>
               <a:rPr lang="en-US" dirty="0" smtClean="0"/>
-              <a:t>3.2.6 </a:t>
-            </a:r>
-            <a:r>
-              <a:rPr lang="en-US" dirty="0" smtClean="0"/>
-              <a:t>The folder will have a text file and </a:t>
+              <a:t>3.2.6 The folder will have a text file and </a:t>
             </a:r>
             <a:r>
               <a:rPr lang="en-US" dirty="0" err="1" smtClean="0"/>
@@ -4292,6 +4299,9 @@
   <p:clrMapOvr>
     <a:masterClrMapping/>
   </p:clrMapOvr>
+  <p:transition>
+    <p:pull dir="lu"/>
+  </p:transition>
 </p:sld>
 </file>
 
@@ -4361,33 +4371,21 @@
           <a:p>
             <a:r>
               <a:rPr lang="en-US" dirty="0" smtClean="0"/>
-              <a:t>3.3.2 </a:t>
-            </a:r>
-            <a:r>
-              <a:rPr lang="en-US" dirty="0" smtClean="0"/>
-              <a:t>The test questions shall be multiple choice.</a:t>
+              <a:t>3.3.2 The test questions shall be multiple choice.</a:t>
             </a:r>
             <a:endParaRPr lang="en-AU" dirty="0" smtClean="0"/>
           </a:p>
           <a:p>
             <a:r>
               <a:rPr lang="en-US" dirty="0" smtClean="0"/>
-              <a:t>3.3.3 </a:t>
-            </a:r>
-            <a:r>
-              <a:rPr lang="en-US" dirty="0" smtClean="0"/>
-              <a:t>The tests shall have questions on Number sense and operation skills.</a:t>
+              <a:t>3.3.3 The tests shall have questions on Number sense and operation skills.</a:t>
             </a:r>
             <a:endParaRPr lang="en-AU" dirty="0" smtClean="0"/>
           </a:p>
           <a:p>
             <a:r>
               <a:rPr lang="en-US" dirty="0" smtClean="0"/>
-              <a:t>3.3.5 </a:t>
-            </a:r>
-            <a:r>
-              <a:rPr lang="en-US" dirty="0" smtClean="0"/>
-              <a:t>The system shall increase the difficulty of the tests.</a:t>
+              <a:t>3.3.5 The system shall increase the difficulty of the tests.</a:t>
             </a:r>
             <a:endParaRPr lang="en-AU" dirty="0" smtClean="0"/>
           </a:p>
@@ -4434,6 +4432,9 @@
   <p:clrMapOvr>
     <a:masterClrMapping/>
   </p:clrMapOvr>
+  <p:transition>
+    <p:pull dir="lu"/>
+  </p:transition>
 </p:sld>
 </file>
 
@@ -4508,88 +4509,56 @@
           <a:p>
             <a:r>
               <a:rPr lang="en-US" dirty="0" smtClean="0"/>
-              <a:t>3.3.8 </a:t>
-            </a:r>
-            <a:r>
-              <a:rPr lang="en-US" dirty="0" smtClean="0"/>
-              <a:t>The pre made list of questions shall be loaded from a file.</a:t>
+              <a:t>3.3.8 The pre made list of questions shall be loaded from a file.</a:t>
             </a:r>
             <a:endParaRPr lang="en-AU" dirty="0" smtClean="0"/>
           </a:p>
           <a:p>
             <a:r>
               <a:rPr lang="en-US" dirty="0" smtClean="0"/>
-              <a:t>3.3.9 </a:t>
-            </a:r>
-            <a:r>
-              <a:rPr lang="en-US" dirty="0" smtClean="0"/>
-              <a:t>Any image shall be loaded from a folder</a:t>
+              <a:t>3.3.9 Any image shall be loaded from a folder</a:t>
             </a:r>
             <a:endParaRPr lang="en-AU" dirty="0" smtClean="0"/>
           </a:p>
           <a:p>
             <a:r>
               <a:rPr lang="en-US" dirty="0" smtClean="0"/>
-              <a:t>3.3.10 </a:t>
-            </a:r>
-            <a:r>
-              <a:rPr lang="en-US" dirty="0" smtClean="0"/>
-              <a:t>Pre k – k tests will have 6 questions</a:t>
+              <a:t>3.3.10 Pre k – k tests will have 6 questions</a:t>
             </a:r>
             <a:endParaRPr lang="en-AU" dirty="0" smtClean="0"/>
           </a:p>
           <a:p>
             <a:r>
               <a:rPr lang="en-US" dirty="0" smtClean="0"/>
-              <a:t>3.3.11 </a:t>
-            </a:r>
-            <a:r>
-              <a:rPr lang="en-US" dirty="0" smtClean="0"/>
-              <a:t>Pre k - k tests shall be passed if the user gets 3/6 correct.</a:t>
+              <a:t>3.3.11 Pre k - k tests shall be passed if the user gets 3/6 correct.</a:t>
             </a:r>
             <a:endParaRPr lang="en-AU" dirty="0" smtClean="0"/>
           </a:p>
           <a:p>
             <a:r>
               <a:rPr lang="en-US" dirty="0" smtClean="0"/>
-              <a:t>The </a:t>
-            </a:r>
-            <a:r>
-              <a:rPr lang="en-US" dirty="0" smtClean="0"/>
-              <a:t>user shall take tests after tutorials.</a:t>
+              <a:t>The user shall take tests after tutorials.</a:t>
             </a:r>
             <a:endParaRPr lang="en-AU" dirty="0" smtClean="0"/>
           </a:p>
           <a:p>
             <a:r>
               <a:rPr lang="en-US" dirty="0" smtClean="0"/>
-              <a:t>3.3.2 </a:t>
-            </a:r>
-            <a:r>
-              <a:rPr lang="en-US" dirty="0" smtClean="0"/>
-              <a:t>The test questions shall be multiple choice.</a:t>
+              <a:t>3.3.2 The test questions shall be multiple choice.</a:t>
             </a:r>
             <a:endParaRPr lang="en-AU" dirty="0" smtClean="0"/>
           </a:p>
           <a:p>
             <a:r>
               <a:rPr lang="en-US" dirty="0" smtClean="0"/>
-              <a:t>3.3.3 </a:t>
-            </a:r>
-            <a:r>
-              <a:rPr lang="en-US" dirty="0" smtClean="0"/>
-              <a:t>The tests shall have questions on Number sense and operation skills.</a:t>
+              <a:t>3.3.3 The tests shall have questions on Number sense and operation skills.</a:t>
             </a:r>
             <a:endParaRPr lang="en-AU" dirty="0" smtClean="0"/>
           </a:p>
           <a:p>
             <a:r>
               <a:rPr lang="en-US" dirty="0" smtClean="0"/>
-              <a:t>3.3.5 </a:t>
-            </a:r>
-            <a:r>
-              <a:rPr lang="en-US" dirty="0" smtClean="0"/>
-              <a:t>The system shall increase the difficulty of the tests.</a:t>
+              <a:t>3.3.5 The system shall increase the difficulty of the tests.</a:t>
             </a:r>
             <a:endParaRPr lang="en-AU" dirty="0" smtClean="0"/>
           </a:p>
@@ -4629,6 +4598,9 @@
   <p:clrMapOvr>
     <a:masterClrMapping/>
   </p:clrMapOvr>
+  <p:transition>
+    <p:pull dir="lu"/>
+  </p:transition>
 </p:sld>
 </file>
 
@@ -4696,11 +4668,7 @@
           <a:p>
             <a:r>
               <a:rPr lang="en-US" dirty="0" smtClean="0"/>
-              <a:t>3.3.6 After completing a test or math level, the system shall give the user stickers</a:t>
-            </a:r>
-            <a:r>
-              <a:rPr lang="en-US" dirty="0" smtClean="0"/>
-              <a:t>.</a:t>
+              <a:t>3.3.6 After completing a test or math level, the system shall give the user stickers.</a:t>
             </a:r>
           </a:p>
           <a:p>
@@ -4713,44 +4681,28 @@
           <a:p>
             <a:r>
               <a:rPr lang="en-US" dirty="0" smtClean="0"/>
-              <a:t>3.5.2 </a:t>
-            </a:r>
-            <a:r>
-              <a:rPr lang="en-US" dirty="0" smtClean="0"/>
-              <a:t>The reports shall be printable.</a:t>
+              <a:t>3.5.2 The reports shall be printable.</a:t>
             </a:r>
             <a:endParaRPr lang="en-AU" dirty="0" smtClean="0"/>
           </a:p>
           <a:p>
             <a:r>
               <a:rPr lang="en-US" dirty="0" smtClean="0"/>
-              <a:t>3.5.3 </a:t>
-            </a:r>
-            <a:r>
-              <a:rPr lang="en-US" dirty="0" smtClean="0"/>
-              <a:t>The reports will show percentage correct</a:t>
+              <a:t>3.5.3 The reports will show percentage correct</a:t>
             </a:r>
             <a:endParaRPr lang="en-AU" dirty="0" smtClean="0"/>
           </a:p>
           <a:p>
             <a:r>
               <a:rPr lang="en-US" dirty="0" smtClean="0"/>
-              <a:t>3.5.4 </a:t>
-            </a:r>
-            <a:r>
-              <a:rPr lang="en-US" dirty="0" smtClean="0"/>
-              <a:t>The reports will show pass/fail</a:t>
+              <a:t>3.5.4 The reports will show pass/fail</a:t>
             </a:r>
             <a:endParaRPr lang="en-AU" dirty="0" smtClean="0"/>
           </a:p>
           <a:p>
             <a:r>
               <a:rPr lang="en-US" dirty="0" smtClean="0"/>
-              <a:t>3.5.5 </a:t>
-            </a:r>
-            <a:r>
-              <a:rPr lang="en-US" dirty="0" smtClean="0"/>
-              <a:t>The reports will show incorrect questions with the correct answer.</a:t>
+              <a:t>3.5.5 The reports will show incorrect questions with the correct answer.</a:t>
             </a:r>
             <a:endParaRPr lang="en-AU" dirty="0" smtClean="0"/>
           </a:p>
@@ -4793,6 +4745,9 @@
   <p:clrMapOvr>
     <a:masterClrMapping/>
   </p:clrMapOvr>
+  <p:transition>
+    <p:pull dir="lu"/>
+  </p:transition>
 </p:sld>
 </file>
 
@@ -4901,6 +4856,9 @@
   <p:clrMapOvr>
     <a:masterClrMapping/>
   </p:clrMapOvr>
+  <p:transition>
+    <p:pull dir="lu"/>
+  </p:transition>
   <p:timing>
     <p:tnLst>
       <p:par>
@@ -5021,6 +4979,9 @@
   <p:clrMapOvr>
     <a:masterClrMapping/>
   </p:clrMapOvr>
+  <p:transition>
+    <p:pull dir="lu"/>
+  </p:transition>
   <p:timing>
     <p:tnLst>
       <p:par>
@@ -5164,6 +5125,9 @@
   <p:clrMapOvr>
     <a:masterClrMapping/>
   </p:clrMapOvr>
+  <p:transition>
+    <p:pull dir="lu"/>
+  </p:transition>
   <p:timing>
     <p:tnLst>
       <p:par>
@@ -5328,6 +5292,9 @@
   <p:clrMapOvr>
     <a:masterClrMapping/>
   </p:clrMapOvr>
+  <p:transition>
+    <p:pull dir="lu"/>
+  </p:transition>
   <p:timing>
     <p:tnLst>
       <p:par>
@@ -5460,6 +5427,9 @@
   <p:clrMapOvr>
     <a:masterClrMapping/>
   </p:clrMapOvr>
+  <p:transition>
+    <p:pull dir="lu"/>
+  </p:transition>
   <p:timing>
     <p:tnLst>
       <p:par>
@@ -5581,6 +5551,9 @@
   <p:clrMapOvr>
     <a:masterClrMapping/>
   </p:clrMapOvr>
+  <p:transition>
+    <p:pull dir="lu"/>
+  </p:transition>
   <p:timing>
     <p:tnLst>
       <p:par>
@@ -5691,6 +5664,9 @@
   <p:clrMapOvr>
     <a:masterClrMapping/>
   </p:clrMapOvr>
+  <p:transition>
+    <p:pull dir="lu"/>
+  </p:transition>
   <p:timing>
     <p:tnLst>
       <p:par>
@@ -5776,15 +5752,7 @@
           <a:p>
             <a:r>
               <a:rPr lang="en-US" dirty="0" smtClean="0"/>
-              <a:t>Consistently Fewer than </a:t>
-            </a:r>
-            <a:r>
-              <a:rPr lang="en-US" dirty="0" smtClean="0"/>
-              <a:t>8 </a:t>
-            </a:r>
-            <a:r>
-              <a:rPr lang="en-US" dirty="0" smtClean="0"/>
-              <a:t>items per area to avoid overwhelming</a:t>
+              <a:t>Consistently Fewer than 8 items per area to avoid overwhelming</a:t>
             </a:r>
             <a:endParaRPr lang="en-AU" dirty="0"/>
           </a:p>
@@ -5795,6 +5763,9 @@
   <p:clrMapOvr>
     <a:masterClrMapping/>
   </p:clrMapOvr>
+  <p:transition>
+    <p:pull dir="lu"/>
+  </p:transition>
   <p:timing>
     <p:tnLst>
       <p:par>
@@ -5877,11 +5848,7 @@
           <a:p>
             <a:r>
               <a:rPr lang="en-US" sz="3300" dirty="0" smtClean="0"/>
-              <a:t>3.4.2 </a:t>
-            </a:r>
-            <a:r>
-              <a:rPr lang="en-US" sz="3300" dirty="0" smtClean="0"/>
-              <a:t>the user shall enter a user name.</a:t>
+              <a:t>3.4.2 the user shall enter a user name.</a:t>
             </a:r>
             <a:endParaRPr lang="en-AU" sz="3300" dirty="0" smtClean="0"/>
           </a:p>
@@ -5895,11 +5862,7 @@
           <a:p>
             <a:r>
               <a:rPr lang="en-US" sz="3300" dirty="0" smtClean="0"/>
-              <a:t>3.4.4 </a:t>
-            </a:r>
-            <a:r>
-              <a:rPr lang="en-US" sz="3300" dirty="0" smtClean="0"/>
-              <a:t>The User shall reenter the password while creating an account.</a:t>
+              <a:t>3.4.4 The User shall reenter the password while creating an account.</a:t>
             </a:r>
             <a:endParaRPr lang="en-AU" sz="3300" dirty="0" smtClean="0"/>
           </a:p>
@@ -5927,11 +5890,7 @@
           <a:p>
             <a:r>
               <a:rPr lang="en-US" sz="3300" dirty="0" smtClean="0"/>
-              <a:t>3.1.4 </a:t>
-            </a:r>
-            <a:r>
-              <a:rPr lang="en-US" sz="3300" dirty="0" smtClean="0"/>
-              <a:t>The help button shall give a short explanation/tutorial of the current activity.</a:t>
+              <a:t>3.1.4 The help button shall give a short explanation/tutorial of the current activity.</a:t>
             </a:r>
             <a:endParaRPr lang="en-AU" sz="3300" dirty="0" smtClean="0"/>
           </a:p>
@@ -5986,6 +5945,16 @@
   <p:clrMapOvr>
     <a:masterClrMapping/>
   </p:clrMapOvr>
+  <p:transition>
+    <p:pull dir="lu"/>
+  </p:transition>
+  <p:timing>
+    <p:tnLst>
+      <p:par>
+        <p:cTn id="1" dur="indefinite" restart="never" nodeType="tmRoot"/>
+      </p:par>
+    </p:tnLst>
+  </p:timing>
 </p:sld>
 </file>
 
@@ -6056,26 +6025,14 @@
           <a:p>
             <a:r>
               <a:rPr lang="en-US" dirty="0" smtClean="0"/>
-              <a:t>3.4.6 </a:t>
-            </a:r>
-            <a:r>
-              <a:rPr lang="en-US" dirty="0" smtClean="0"/>
-              <a:t>After choosing an existing account the user shall enter a password.</a:t>
+              <a:t>3.4.6 After choosing an existing account the user shall enter a password.</a:t>
             </a:r>
             <a:endParaRPr lang="en-AU" dirty="0" smtClean="0"/>
           </a:p>
           <a:p>
             <a:r>
               <a:rPr lang="en-US" dirty="0" smtClean="0"/>
-              <a:t>3.4.7 </a:t>
-            </a:r>
-            <a:r>
-              <a:rPr lang="en-US" dirty="0" smtClean="0"/>
-              <a:t>The user shall be able to log out in the main window</a:t>
-            </a:r>
-            <a:r>
-              <a:rPr lang="en-US" dirty="0" smtClean="0"/>
-              <a:t>.</a:t>
+              <a:t>3.4.7 The user shall be able to log out in the main window.</a:t>
             </a:r>
             <a:endParaRPr lang="en-AU" b="1" dirty="0" smtClean="0"/>
           </a:p>
@@ -6119,6 +6076,16 @@
   <p:clrMapOvr>
     <a:masterClrMapping/>
   </p:clrMapOvr>
+  <p:transition>
+    <p:pull dir="lu"/>
+  </p:transition>
+  <p:timing>
+    <p:tnLst>
+      <p:par>
+        <p:cTn id="1" dur="indefinite" restart="never" nodeType="tmRoot"/>
+      </p:par>
+    </p:tnLst>
+  </p:timing>
 </p:sld>
 </file>
 
@@ -6207,15 +6174,7 @@
           <a:p>
             <a:r>
               <a:rPr lang="en-US" dirty="0" smtClean="0"/>
-              <a:t>3.1.4 </a:t>
-            </a:r>
-            <a:r>
-              <a:rPr lang="en-US" dirty="0" smtClean="0"/>
-              <a:t>The help button shall give a short explanation/tutorial of the current activity</a:t>
-            </a:r>
-            <a:r>
-              <a:rPr lang="en-US" dirty="0" smtClean="0"/>
-              <a:t>.</a:t>
+              <a:t>3.1.4 The help button shall give a short explanation/tutorial of the current activity.</a:t>
             </a:r>
             <a:endParaRPr lang="en-AU" dirty="0" smtClean="0"/>
           </a:p>
@@ -6273,6 +6232,9 @@
   <p:clrMapOvr>
     <a:masterClrMapping/>
   </p:clrMapOvr>
+  <p:transition>
+    <p:pull dir="lu"/>
+  </p:transition>
 </p:sld>
 </file>
 

</xml_diff>